<commit_message>
added to lab 1 presentation
</commit_message>
<xml_diff>
--- a/lab1/CS 341 Lab introduction.pptx
+++ b/lab1/CS 341 Lab introduction.pptx
@@ -5818,6 +5818,16 @@
             </a:r>
           </a:p>
           <a:p>
+            <a:pPr lvl="1">
+              <a:buFont typeface="Wingdings" panose="05000000000000000000" pitchFamily="2" charset="2"/>
+              <a:buChar char="§"/>
+            </a:pPr>
+            <a:r>
+              <a:rPr lang="en-US" dirty="0"/>
+              <a:t>Instructions provided in lab 1 instructions</a:t>
+            </a:r>
+          </a:p>
+          <a:p>
             <a:pPr>
               <a:buFont typeface="Wingdings" panose="05000000000000000000" pitchFamily="2" charset="2"/>
               <a:buChar char="§"/>
@@ -5833,10 +5843,9 @@
               <a:buChar char="§"/>
             </a:pPr>
             <a:r>
-              <a:rPr lang="en-US"/>
+              <a:rPr lang="en-US" dirty="0"/>
               <a:t> </a:t>
             </a:r>
-            <a:endParaRPr lang="en-US" dirty="0"/>
           </a:p>
         </p:txBody>
       </p:sp>

</xml_diff>